<commit_message>
presentation update, including slide with current status of the project
</commit_message>
<xml_diff>
--- a/docs/FallDetection.pptx
+++ b/docs/FallDetection.pptx
@@ -5,7 +5,7 @@
     <p:sldMasterId id="2147483648" r:id="rId1"/>
   </p:sldMasterIdLst>
   <p:notesMasterIdLst>
-    <p:notesMasterId r:id="rId10"/>
+    <p:notesMasterId r:id="rId9"/>
   </p:notesMasterIdLst>
   <p:sldIdLst>
     <p:sldId id="256" r:id="rId2"/>
@@ -14,8 +14,7 @@
     <p:sldId id="260" r:id="rId5"/>
     <p:sldId id="262" r:id="rId6"/>
     <p:sldId id="264" r:id="rId7"/>
-    <p:sldId id="263" r:id="rId8"/>
-    <p:sldId id="261" r:id="rId9"/>
+    <p:sldId id="261" r:id="rId8"/>
   </p:sldIdLst>
   <p:sldSz cx="12192000" cy="6858000"/>
   <p:notesSz cx="6858000" cy="9144000"/>
@@ -204,7 +203,7 @@
           <a:p>
             <a:fld id="{126F6D23-B8E2-2443-96D3-084056B946C0}" type="datetimeFigureOut">
               <a:rPr lang="en-US" smtClean="0"/>
-              <a:t>3/1/18</a:t>
+              <a:t>3/2/18</a:t>
             </a:fld>
             <a:endParaRPr lang="en-US"/>
           </a:p>
@@ -723,90 +722,6 @@
 </p:notes>
 </file>
 
-<file path=ppt/notesSlides/notesSlide4.xml><?xml version="1.0" encoding="utf-8"?>
-<p:notes xmlns:a="http://schemas.openxmlformats.org/drawingml/2006/main" xmlns:r="http://schemas.openxmlformats.org/officeDocument/2006/relationships" xmlns:p="http://schemas.openxmlformats.org/presentationml/2006/main">
-  <p:cSld>
-    <p:spTree>
-      <p:nvGrpSpPr>
-        <p:cNvPr id="1" name=""/>
-        <p:cNvGrpSpPr/>
-        <p:nvPr/>
-      </p:nvGrpSpPr>
-      <p:grpSpPr>
-        <a:xfrm>
-          <a:off x="0" y="0"/>
-          <a:ext cx="0" cy="0"/>
-          <a:chOff x="0" y="0"/>
-          <a:chExt cx="0" cy="0"/>
-        </a:xfrm>
-      </p:grpSpPr>
-      <p:sp>
-        <p:nvSpPr>
-          <p:cNvPr id="2" name="Slide Image Placeholder 1"/>
-          <p:cNvSpPr>
-            <a:spLocks noGrp="1" noRot="1" noChangeAspect="1"/>
-          </p:cNvSpPr>
-          <p:nvPr>
-            <p:ph type="sldImg"/>
-          </p:nvPr>
-        </p:nvSpPr>
-        <p:spPr/>
-      </p:sp>
-      <p:sp>
-        <p:nvSpPr>
-          <p:cNvPr id="3" name="Notes Placeholder 2"/>
-          <p:cNvSpPr>
-            <a:spLocks noGrp="1"/>
-          </p:cNvSpPr>
-          <p:nvPr>
-            <p:ph type="body" idx="1"/>
-          </p:nvPr>
-        </p:nvSpPr>
-        <p:spPr/>
-        <p:txBody>
-          <a:bodyPr/>
-          <a:lstStyle/>
-          <a:p>
-            <a:endParaRPr lang="en-US" dirty="0"/>
-          </a:p>
-        </p:txBody>
-      </p:sp>
-      <p:sp>
-        <p:nvSpPr>
-          <p:cNvPr id="4" name="Slide Number Placeholder 3"/>
-          <p:cNvSpPr>
-            <a:spLocks noGrp="1"/>
-          </p:cNvSpPr>
-          <p:nvPr>
-            <p:ph type="sldNum" sz="quarter" idx="10"/>
-          </p:nvPr>
-        </p:nvSpPr>
-        <p:spPr/>
-        <p:txBody>
-          <a:bodyPr/>
-          <a:lstStyle/>
-          <a:p>
-            <a:fld id="{F466AC0D-1CAD-0D44-B869-4755A8D37EE1}" type="slidenum">
-              <a:rPr lang="en-US" smtClean="0"/>
-              <a:t>7</a:t>
-            </a:fld>
-            <a:endParaRPr lang="en-US"/>
-          </a:p>
-        </p:txBody>
-      </p:sp>
-    </p:spTree>
-    <p:extLst>
-      <p:ext uri="{BB962C8B-B14F-4D97-AF65-F5344CB8AC3E}">
-        <p14:creationId xmlns:p14="http://schemas.microsoft.com/office/powerpoint/2010/main" val="1386806356"/>
-      </p:ext>
-    </p:extLst>
-  </p:cSld>
-  <p:clrMapOvr>
-    <a:masterClrMapping/>
-  </p:clrMapOvr>
-</p:notes>
-</file>
-
 <file path=ppt/slideLayouts/slideLayout1.xml><?xml version="1.0" encoding="utf-8"?>
 <p:sldLayout xmlns:a="http://schemas.openxmlformats.org/drawingml/2006/main" xmlns:r="http://schemas.openxmlformats.org/officeDocument/2006/relationships" xmlns:p="http://schemas.openxmlformats.org/presentationml/2006/main" type="title" preserve="1">
   <p:cSld name="Title Slide">
@@ -936,7 +851,7 @@
           <a:p>
             <a:fld id="{C40EB393-315D-9D45-8062-11EFD1068A92}" type="datetimeFigureOut">
               <a:rPr lang="en-US" smtClean="0"/>
-              <a:t>3/1/18</a:t>
+              <a:t>3/2/18</a:t>
             </a:fld>
             <a:endParaRPr lang="en-US"/>
           </a:p>
@@ -1104,7 +1019,7 @@
           <a:p>
             <a:fld id="{C40EB393-315D-9D45-8062-11EFD1068A92}" type="datetimeFigureOut">
               <a:rPr lang="en-US" smtClean="0"/>
-              <a:t>3/1/18</a:t>
+              <a:t>3/2/18</a:t>
             </a:fld>
             <a:endParaRPr lang="en-US"/>
           </a:p>
@@ -1282,7 +1197,7 @@
           <a:p>
             <a:fld id="{C40EB393-315D-9D45-8062-11EFD1068A92}" type="datetimeFigureOut">
               <a:rPr lang="en-US" smtClean="0"/>
-              <a:t>3/1/18</a:t>
+              <a:t>3/2/18</a:t>
             </a:fld>
             <a:endParaRPr lang="en-US"/>
           </a:p>
@@ -1450,7 +1365,7 @@
           <a:p>
             <a:fld id="{C40EB393-315D-9D45-8062-11EFD1068A92}" type="datetimeFigureOut">
               <a:rPr lang="en-US" smtClean="0"/>
-              <a:t>3/1/18</a:t>
+              <a:t>3/2/18</a:t>
             </a:fld>
             <a:endParaRPr lang="en-US"/>
           </a:p>
@@ -1695,7 +1610,7 @@
           <a:p>
             <a:fld id="{C40EB393-315D-9D45-8062-11EFD1068A92}" type="datetimeFigureOut">
               <a:rPr lang="en-US" smtClean="0"/>
-              <a:t>3/1/18</a:t>
+              <a:t>3/2/18</a:t>
             </a:fld>
             <a:endParaRPr lang="en-US"/>
           </a:p>
@@ -1924,7 +1839,7 @@
           <a:p>
             <a:fld id="{C40EB393-315D-9D45-8062-11EFD1068A92}" type="datetimeFigureOut">
               <a:rPr lang="en-US" smtClean="0"/>
-              <a:t>3/1/18</a:t>
+              <a:t>3/2/18</a:t>
             </a:fld>
             <a:endParaRPr lang="en-US"/>
           </a:p>
@@ -2288,7 +2203,7 @@
           <a:p>
             <a:fld id="{C40EB393-315D-9D45-8062-11EFD1068A92}" type="datetimeFigureOut">
               <a:rPr lang="en-US" smtClean="0"/>
-              <a:t>3/1/18</a:t>
+              <a:t>3/2/18</a:t>
             </a:fld>
             <a:endParaRPr lang="en-US"/>
           </a:p>
@@ -2405,7 +2320,7 @@
           <a:p>
             <a:fld id="{C40EB393-315D-9D45-8062-11EFD1068A92}" type="datetimeFigureOut">
               <a:rPr lang="en-US" smtClean="0"/>
-              <a:t>3/1/18</a:t>
+              <a:t>3/2/18</a:t>
             </a:fld>
             <a:endParaRPr lang="en-US"/>
           </a:p>
@@ -2500,7 +2415,7 @@
           <a:p>
             <a:fld id="{C40EB393-315D-9D45-8062-11EFD1068A92}" type="datetimeFigureOut">
               <a:rPr lang="en-US" smtClean="0"/>
-              <a:t>3/1/18</a:t>
+              <a:t>3/2/18</a:t>
             </a:fld>
             <a:endParaRPr lang="en-US"/>
           </a:p>
@@ -2775,7 +2690,7 @@
           <a:p>
             <a:fld id="{C40EB393-315D-9D45-8062-11EFD1068A92}" type="datetimeFigureOut">
               <a:rPr lang="en-US" smtClean="0"/>
-              <a:t>3/1/18</a:t>
+              <a:t>3/2/18</a:t>
             </a:fld>
             <a:endParaRPr lang="en-US"/>
           </a:p>
@@ -3027,7 +2942,7 @@
           <a:p>
             <a:fld id="{C40EB393-315D-9D45-8062-11EFD1068A92}" type="datetimeFigureOut">
               <a:rPr lang="en-US" smtClean="0"/>
-              <a:t>3/1/18</a:t>
+              <a:t>3/2/18</a:t>
             </a:fld>
             <a:endParaRPr lang="en-US"/>
           </a:p>
@@ -3238,7 +3153,7 @@
           <a:p>
             <a:fld id="{C40EB393-315D-9D45-8062-11EFD1068A92}" type="datetimeFigureOut">
               <a:rPr lang="en-US" smtClean="0"/>
-              <a:t>3/1/18</a:t>
+              <a:t>3/2/18</a:t>
             </a:fld>
             <a:endParaRPr lang="en-US"/>
           </a:p>
@@ -4477,9 +4392,6 @@
           </a:bodyPr>
           <a:lstStyle/>
           <a:p>
-            <a:endParaRPr lang="en-US" dirty="0"/>
-          </a:p>
-          <a:p>
             <a:pPr marL="0" indent="0">
               <a:buNone/>
             </a:pPr>
@@ -4499,6 +4411,51 @@
               <a:rPr lang="en-US" dirty="0"/>
               <a:t>Use different Machine Learning algorithms</a:t>
             </a:r>
+          </a:p>
+          <a:p>
+            <a:pPr marL="0" indent="0">
+              <a:buNone/>
+            </a:pPr>
+            <a:r>
+              <a:rPr lang="en-US" b="1" dirty="0"/>
+              <a:t>Fall Prediction</a:t>
+            </a:r>
+          </a:p>
+          <a:p>
+            <a:r>
+              <a:rPr lang="en-US" dirty="0"/>
+              <a:t>Identify a fall before it happens</a:t>
+            </a:r>
+          </a:p>
+          <a:p>
+            <a:r>
+              <a:rPr lang="en-US" dirty="0"/>
+              <a:t>Use data from other sensors</a:t>
+            </a:r>
+          </a:p>
+          <a:p>
+            <a:pPr marL="0" indent="0">
+              <a:buNone/>
+            </a:pPr>
+            <a:r>
+              <a:rPr lang="en-US" b="1" dirty="0"/>
+              <a:t>Collect and Analyze sensor data in real time</a:t>
+            </a:r>
+          </a:p>
+          <a:p>
+            <a:r>
+              <a:rPr lang="en-US" dirty="0"/>
+              <a:t>Streaming techniques</a:t>
+            </a:r>
+          </a:p>
+          <a:p>
+            <a:endParaRPr lang="en-US" dirty="0"/>
+          </a:p>
+          <a:p>
+            <a:pPr marL="0" indent="0">
+              <a:buNone/>
+            </a:pPr>
+            <a:endParaRPr lang="en-US" dirty="0"/>
           </a:p>
         </p:txBody>
       </p:sp>
@@ -4553,7 +4510,7 @@
                   <a:srgbClr val="004D97"/>
                 </a:solidFill>
               </a:rPr>
-              <a:t>Goals</a:t>
+              <a:t>Current Situation</a:t>
             </a:r>
           </a:p>
         </p:txBody>
@@ -4575,27 +4532,27 @@
           </a:bodyPr>
           <a:lstStyle/>
           <a:p>
-            <a:endParaRPr lang="en-US" dirty="0"/>
-          </a:p>
-          <a:p>
-            <a:pPr marL="0" indent="0">
-              <a:buNone/>
-            </a:pPr>
-            <a:r>
-              <a:rPr lang="en-US" b="1" dirty="0"/>
-              <a:t>Fall Prediction</a:t>
-            </a:r>
-          </a:p>
-          <a:p>
             <a:r>
               <a:rPr lang="en-US" dirty="0"/>
-              <a:t>Identify a fall before it happens</a:t>
+              <a:t>Exploratory Data Analysis</a:t>
             </a:r>
           </a:p>
           <a:p>
             <a:r>
               <a:rPr lang="en-US" dirty="0"/>
-              <a:t>Use data from other sensors</a:t>
+              <a:t>Preprocessing</a:t>
+            </a:r>
+          </a:p>
+          <a:p>
+            <a:r>
+              <a:rPr lang="en-US" dirty="0"/>
+              <a:t>Model</a:t>
+            </a:r>
+          </a:p>
+          <a:p>
+            <a:r>
+              <a:rPr lang="en-US" dirty="0"/>
+              <a:t>Streaming</a:t>
             </a:r>
           </a:p>
         </p:txBody>
@@ -4614,98 +4571,6 @@
 </file>
 
 <file path=ppt/slides/slide7.xml><?xml version="1.0" encoding="utf-8"?>
-<p:sld xmlns:a="http://schemas.openxmlformats.org/drawingml/2006/main" xmlns:r="http://schemas.openxmlformats.org/officeDocument/2006/relationships" xmlns:p="http://schemas.openxmlformats.org/presentationml/2006/main">
-  <p:cSld>
-    <p:spTree>
-      <p:nvGrpSpPr>
-        <p:cNvPr id="1" name=""/>
-        <p:cNvGrpSpPr/>
-        <p:nvPr/>
-      </p:nvGrpSpPr>
-      <p:grpSpPr>
-        <a:xfrm>
-          <a:off x="0" y="0"/>
-          <a:ext cx="0" cy="0"/>
-          <a:chOff x="0" y="0"/>
-          <a:chExt cx="0" cy="0"/>
-        </a:xfrm>
-      </p:grpSpPr>
-      <p:sp>
-        <p:nvSpPr>
-          <p:cNvPr id="2" name="Title 1"/>
-          <p:cNvSpPr>
-            <a:spLocks noGrp="1"/>
-          </p:cNvSpPr>
-          <p:nvPr>
-            <p:ph type="title"/>
-          </p:nvPr>
-        </p:nvSpPr>
-        <p:spPr/>
-        <p:txBody>
-          <a:bodyPr/>
-          <a:lstStyle/>
-          <a:p>
-            <a:r>
-              <a:rPr lang="en-US" b="1" dirty="0">
-                <a:solidFill>
-                  <a:srgbClr val="004D97"/>
-                </a:solidFill>
-              </a:rPr>
-              <a:t>Goals</a:t>
-            </a:r>
-          </a:p>
-        </p:txBody>
-      </p:sp>
-      <p:sp>
-        <p:nvSpPr>
-          <p:cNvPr id="3" name="Content Placeholder 2"/>
-          <p:cNvSpPr>
-            <a:spLocks noGrp="1"/>
-          </p:cNvSpPr>
-          <p:nvPr>
-            <p:ph idx="1"/>
-          </p:nvPr>
-        </p:nvSpPr>
-        <p:spPr/>
-        <p:txBody>
-          <a:bodyPr>
-            <a:normAutofit/>
-          </a:bodyPr>
-          <a:lstStyle/>
-          <a:p>
-            <a:endParaRPr lang="en-US" dirty="0"/>
-          </a:p>
-          <a:p>
-            <a:pPr marL="0" indent="0">
-              <a:buNone/>
-            </a:pPr>
-            <a:r>
-              <a:rPr lang="en-US" b="1" dirty="0"/>
-              <a:t>Collect and Analyze sensor data in real time</a:t>
-            </a:r>
-          </a:p>
-          <a:p>
-            <a:r>
-              <a:rPr lang="en-US" dirty="0"/>
-              <a:t>Streaming techniques</a:t>
-            </a:r>
-          </a:p>
-        </p:txBody>
-      </p:sp>
-    </p:spTree>
-    <p:extLst>
-      <p:ext uri="{BB962C8B-B14F-4D97-AF65-F5344CB8AC3E}">
-        <p14:creationId xmlns:p14="http://schemas.microsoft.com/office/powerpoint/2010/main" val="3261064151"/>
-      </p:ext>
-    </p:extLst>
-  </p:cSld>
-  <p:clrMapOvr>
-    <a:masterClrMapping/>
-  </p:clrMapOvr>
-</p:sld>
-</file>
-
-<file path=ppt/slides/slide8.xml><?xml version="1.0" encoding="utf-8"?>
 <p:sld xmlns:a="http://schemas.openxmlformats.org/drawingml/2006/main" xmlns:r="http://schemas.openxmlformats.org/officeDocument/2006/relationships" xmlns:p="http://schemas.openxmlformats.org/presentationml/2006/main">
   <p:cSld>
     <p:spTree>

</xml_diff>

<commit_message>
minor modification in the Motivation slide
</commit_message>
<xml_diff>
--- a/docs/FallDetection.pptx
+++ b/docs/FallDetection.pptx
@@ -9,7 +9,7 @@
   </p:notesMasterIdLst>
   <p:sldIdLst>
     <p:sldId id="256" r:id="rId2"/>
-    <p:sldId id="258" r:id="rId3"/>
+    <p:sldId id="267" r:id="rId3"/>
     <p:sldId id="265" r:id="rId4"/>
     <p:sldId id="260" r:id="rId5"/>
     <p:sldId id="266" r:id="rId6"/>
@@ -5212,7 +5212,7 @@
     </p:spTree>
     <p:extLst>
       <p:ext uri="{BB962C8B-B14F-4D97-AF65-F5344CB8AC3E}">
-        <p14:creationId xmlns:p14="http://schemas.microsoft.com/office/powerpoint/2010/main" val="3500620927"/>
+        <p14:creationId xmlns:p14="http://schemas.microsoft.com/office/powerpoint/2010/main" val="3141873868"/>
       </p:ext>
     </p:extLst>
   </p:cSld>
@@ -8631,22 +8631,28 @@
             <p:ph idx="1"/>
           </p:nvPr>
         </p:nvSpPr>
-        <p:spPr/>
+        <p:spPr>
+          <a:xfrm>
+            <a:off x="838200" y="1825625"/>
+            <a:ext cx="10515600" cy="4351338"/>
+          </a:xfrm>
+        </p:spPr>
         <p:txBody>
           <a:bodyPr>
             <a:normAutofit/>
           </a:bodyPr>
           <a:lstStyle/>
           <a:p>
+            <a:pPr fontAlgn="base"/>
+            <a:r>
+              <a:rPr lang="en-CA" dirty="0"/>
+              <a:t>Falls are the second leading cause of accidental or unintentional injury deaths worldwide (behind only of road traffic injuries)</a:t>
+            </a:r>
+          </a:p>
+          <a:p>
             <a:r>
               <a:rPr lang="en-US" dirty="0"/>
-              <a:t>Falls are the leading cause of injury-related morbidity and mortality among older adults</a:t>
-            </a:r>
-          </a:p>
-          <a:p>
-            <a:r>
-              <a:rPr lang="en-US" dirty="0"/>
-              <a:t>Almost 50% of older adults who fall experience a minor injury</a:t>
+              <a:t>Almost 50% who fall experience a minor injury</a:t>
             </a:r>
           </a:p>
           <a:p>
@@ -8658,13 +8664,13 @@
           <a:p>
             <a:r>
               <a:rPr lang="en-US" dirty="0"/>
-              <a:t>Less then 50%  of elder patients who fell tell their doctor they have had a fall</a:t>
+              <a:t>Less then 50% who fell tell their doctor they have had a fall</a:t>
             </a:r>
           </a:p>
           <a:p>
             <a:r>
               <a:rPr lang="en-CA" dirty="0"/>
-              <a:t>Each year, 2.8 million older people are treated in emergency departments for fall injuries</a:t>
+              <a:t>Each year, 2.8 million are treated in emergency departments for fall injuries</a:t>
             </a:r>
             <a:endParaRPr lang="en-US" dirty="0"/>
           </a:p>
@@ -8682,7 +8688,7 @@
     </p:spTree>
     <p:extLst>
       <p:ext uri="{BB962C8B-B14F-4D97-AF65-F5344CB8AC3E}">
-        <p14:creationId xmlns:p14="http://schemas.microsoft.com/office/powerpoint/2010/main" val="1530183166"/>
+        <p14:creationId xmlns:p14="http://schemas.microsoft.com/office/powerpoint/2010/main" val="907925164"/>
       </p:ext>
     </p:extLst>
   </p:cSld>
@@ -8964,7 +8970,7 @@
       </p:par>
     </p:tnLst>
     <p:bldLst>
-      <p:bldP spid="3" grpId="0" build="p"/>
+      <p:bldP spid="3" grpId="0" uiExpand="1" build="p"/>
     </p:bldLst>
   </p:timing>
 </p:sld>
@@ -10818,64 +10824,32 @@
               </a:rPr>
             </a:br>
             <a:r>
-              <a:rPr lang="en-US" sz="3200" b="1" dirty="0">
-                <a:solidFill>
-                  <a:srgbClr val="004D97"/>
-                </a:solidFill>
-              </a:rPr>
+              <a:rPr lang="en-US" sz="3200" b="1" dirty="0"/>
               <a:t>Gustavo Felhberg</a:t>
             </a:r>
             <a:br>
-              <a:rPr lang="en-US" sz="3200" b="1" dirty="0">
-                <a:solidFill>
-                  <a:srgbClr val="004D97"/>
-                </a:solidFill>
-              </a:rPr>
+              <a:rPr lang="en-US" sz="3200" b="1" dirty="0"/>
             </a:br>
             <a:r>
-              <a:rPr lang="en-US" sz="3200" b="1" dirty="0">
-                <a:solidFill>
-                  <a:srgbClr val="004D97"/>
-                </a:solidFill>
-              </a:rPr>
+              <a:rPr lang="en-US" sz="3200" b="1" dirty="0"/>
               <a:t>Jorge </a:t>
             </a:r>
             <a:r>
-              <a:rPr lang="en-US" sz="3200" b="1" dirty="0" err="1">
-                <a:solidFill>
-                  <a:srgbClr val="004D97"/>
-                </a:solidFill>
-              </a:rPr>
+              <a:rPr lang="en-US" sz="3200" b="1" dirty="0" err="1"/>
               <a:t>Marcano</a:t>
             </a:r>
             <a:br>
-              <a:rPr lang="en-US" sz="3200" b="1" dirty="0">
-                <a:solidFill>
-                  <a:srgbClr val="004D97"/>
-                </a:solidFill>
-              </a:rPr>
+              <a:rPr lang="en-US" sz="3200" b="1" dirty="0"/>
             </a:br>
             <a:r>
-              <a:rPr lang="en-US" sz="3200" b="1" dirty="0">
-                <a:solidFill>
-                  <a:srgbClr val="004D97"/>
-                </a:solidFill>
-              </a:rPr>
+              <a:rPr lang="en-US" sz="3200" b="1" dirty="0"/>
               <a:t>Muhammad </a:t>
             </a:r>
             <a:r>
-              <a:rPr lang="en-US" sz="3200" b="1" dirty="0" err="1">
-                <a:solidFill>
-                  <a:srgbClr val="004D97"/>
-                </a:solidFill>
-              </a:rPr>
+              <a:rPr lang="en-US" sz="3200" b="1" dirty="0" err="1"/>
               <a:t>Muhaimin</a:t>
             </a:r>
-            <a:endParaRPr lang="en-US" sz="3100" b="1" dirty="0">
-              <a:solidFill>
-                <a:srgbClr val="004D97"/>
-              </a:solidFill>
-            </a:endParaRPr>
+            <a:endParaRPr lang="en-US" sz="3100" b="1" dirty="0"/>
           </a:p>
         </p:txBody>
       </p:sp>

</xml_diff>

<commit_message>
adding slide with EDA
</commit_message>
<xml_diff>
--- a/docs/FallDetection.pptx
+++ b/docs/FallDetection.pptx
@@ -5,7 +5,7 @@
     <p:sldMasterId id="2147483648" r:id="rId1"/>
   </p:sldMasterIdLst>
   <p:notesMasterIdLst>
-    <p:notesMasterId r:id="rId8"/>
+    <p:notesMasterId r:id="rId9"/>
   </p:notesMasterIdLst>
   <p:sldIdLst>
     <p:sldId id="256" r:id="rId2"/>
@@ -13,7 +13,8 @@
     <p:sldId id="265" r:id="rId4"/>
     <p:sldId id="260" r:id="rId5"/>
     <p:sldId id="266" r:id="rId6"/>
-    <p:sldId id="261" r:id="rId7"/>
+    <p:sldId id="269" r:id="rId7"/>
+    <p:sldId id="261" r:id="rId8"/>
   </p:sldIdLst>
   <p:sldSz cx="12192000" cy="6858000"/>
   <p:notesSz cx="6858000" cy="9144000"/>
@@ -1338,20 +1339,9 @@
         <a:p>
           <a:r>
             <a:rPr lang="en-US" sz="1600" dirty="0"/>
-            <a:t>Fall Prediction </a:t>
+            <a:t>Fall Prediction</a:t>
           </a:r>
-          <a:r>
-            <a:rPr lang="en-US" sz="1200" dirty="0"/>
-            <a:t>(60% accuracy </a:t>
-          </a:r>
-          <a:r>
-            <a:rPr lang="en-US" sz="1200" dirty="0" err="1"/>
-            <a:t>atm</a:t>
-          </a:r>
-          <a:r>
-            <a:rPr lang="en-US" sz="1200" dirty="0"/>
-            <a:t>)</a:t>
-          </a:r>
+          <a:endParaRPr lang="en-US" sz="1200" dirty="0"/>
         </a:p>
       </dgm:t>
     </dgm:pt>
@@ -1367,42 +1357,6 @@
       </dgm:t>
     </dgm:pt>
     <dgm:pt modelId="{2E644A2E-24E1-DB4D-AFE8-F1341858E7CF}" type="sibTrans" cxnId="{5F0FF218-5893-5E4B-9DF3-85605988F375}">
-      <dgm:prSet/>
-      <dgm:spPr/>
-      <dgm:t>
-        <a:bodyPr/>
-        <a:lstStyle/>
-        <a:p>
-          <a:endParaRPr lang="en-US"/>
-        </a:p>
-      </dgm:t>
-    </dgm:pt>
-    <dgm:pt modelId="{67376583-BBC6-894B-9D93-94AD14F2B924}">
-      <dgm:prSet/>
-      <dgm:spPr/>
-      <dgm:t>
-        <a:bodyPr/>
-        <a:lstStyle/>
-        <a:p>
-          <a:r>
-            <a:rPr lang="en-US" sz="1600" dirty="0"/>
-            <a:t>Real time data</a:t>
-          </a:r>
-        </a:p>
-      </dgm:t>
-    </dgm:pt>
-    <dgm:pt modelId="{9CC2F362-5221-9448-A2AA-4F7D2F8B3A66}" type="parTrans" cxnId="{B5CF009E-16E6-4B4E-A1B7-AB310749A19A}">
-      <dgm:prSet/>
-      <dgm:spPr/>
-      <dgm:t>
-        <a:bodyPr/>
-        <a:lstStyle/>
-        <a:p>
-          <a:endParaRPr lang="en-US"/>
-        </a:p>
-      </dgm:t>
-    </dgm:pt>
-    <dgm:pt modelId="{708D1DBD-D48B-BB47-8CCC-005C24154BF0}" type="sibTrans" cxnId="{B5CF009E-16E6-4B4E-A1B7-AB310749A19A}">
       <dgm:prSet/>
       <dgm:spPr/>
       <dgm:t>
@@ -1508,6 +1462,43 @@
       </dgm:t>
     </dgm:pt>
     <dgm:pt modelId="{9043EEF5-0D5C-1449-A0E3-1029D805A759}" type="sibTrans" cxnId="{03B95D9E-7AA8-BE4B-BBE1-03463CD401C4}">
+      <dgm:prSet/>
+      <dgm:spPr/>
+      <dgm:t>
+        <a:bodyPr/>
+        <a:lstStyle/>
+        <a:p>
+          <a:endParaRPr lang="en-US"/>
+        </a:p>
+      </dgm:t>
+    </dgm:pt>
+    <dgm:pt modelId="{84FF01F9-2949-F843-8C54-AC00A5244708}">
+      <dgm:prSet custT="1"/>
+      <dgm:spPr/>
+      <dgm:t>
+        <a:bodyPr/>
+        <a:lstStyle/>
+        <a:p>
+          <a:r>
+            <a:rPr lang="en-US" sz="1600" dirty="0"/>
+            <a:t>Real time data</a:t>
+          </a:r>
+          <a:endParaRPr lang="en-US" sz="1200" dirty="0"/>
+        </a:p>
+      </dgm:t>
+    </dgm:pt>
+    <dgm:pt modelId="{59DE3910-8FC5-D249-9054-C205B507B721}" type="parTrans" cxnId="{2BB6986A-76C0-B54F-8F48-2E854A1A94D4}">
+      <dgm:prSet/>
+      <dgm:spPr/>
+      <dgm:t>
+        <a:bodyPr/>
+        <a:lstStyle/>
+        <a:p>
+          <a:endParaRPr lang="en-US"/>
+        </a:p>
+      </dgm:t>
+    </dgm:pt>
+    <dgm:pt modelId="{7D11DA30-2F53-B144-9B1E-7786A5FB56E2}" type="sibTrans" cxnId="{2BB6986A-76C0-B54F-8F48-2E854A1A94D4}">
       <dgm:prSet/>
       <dgm:spPr/>
       <dgm:t>
@@ -1806,15 +1797,14 @@
     <dgm:cxn modelId="{B812435D-17BD-3749-857A-2E0F0A80477B}" srcId="{0B62EB6C-54FF-374D-AB7F-7BEB330B1BE9}" destId="{909A40AF-CCEB-B948-9301-D292640A04EB}" srcOrd="3" destOrd="0" parTransId="{F7DA669F-42CB-0C4B-9F77-4950E1F72BA6}" sibTransId="{0E4E6E7C-1A84-D04C-B824-8638EC10F995}"/>
     <dgm:cxn modelId="{69EDC864-39B9-5D47-A9F9-A89C40DD47D3}" type="presOf" srcId="{41E72236-A962-FA4A-B895-65B14FAE023D}" destId="{E7E3E7EC-E923-0C4F-998A-898D18B5ABB2}" srcOrd="0" destOrd="0" presId="urn:microsoft.com/office/officeart/2005/8/layout/hProcess4"/>
     <dgm:cxn modelId="{12B96D6A-4245-B44C-972E-FC4DA9083670}" srcId="{0B62EB6C-54FF-374D-AB7F-7BEB330B1BE9}" destId="{FE1AB45A-3162-9447-BB07-197724914D94}" srcOrd="4" destOrd="0" parTransId="{B5B6D969-361C-A943-A375-98DE0D5FCF08}" sibTransId="{4DF2DDCD-84D6-CF41-B78A-A4B8CF76947E}"/>
+    <dgm:cxn modelId="{2BB6986A-76C0-B54F-8F48-2E854A1A94D4}" srcId="{ADE002A1-B52E-D54C-9867-263666CD5CCE}" destId="{84FF01F9-2949-F843-8C54-AC00A5244708}" srcOrd="1" destOrd="0" parTransId="{59DE3910-8FC5-D249-9054-C205B507B721}" sibTransId="{7D11DA30-2F53-B144-9B1E-7786A5FB56E2}"/>
     <dgm:cxn modelId="{C16FA86D-F704-294C-BCF0-C98D907C5664}" type="presOf" srcId="{0B62EB6C-54FF-374D-AB7F-7BEB330B1BE9}" destId="{3EEC1302-D41B-C643-BC9D-B0546ACD1CC4}" srcOrd="0" destOrd="0" presId="urn:microsoft.com/office/officeart/2005/8/layout/hProcess4"/>
     <dgm:cxn modelId="{F5FF777B-47D6-E849-A225-795BB54F7DB4}" srcId="{0B62EB6C-54FF-374D-AB7F-7BEB330B1BE9}" destId="{3E6AF46F-5627-5C46-A116-A0D0C714EC0A}" srcOrd="1" destOrd="0" parTransId="{4ED40431-D84F-FC4C-A23E-B32E94D4A916}" sibTransId="{09C790D7-A826-E14F-8C65-4FB978F33989}"/>
     <dgm:cxn modelId="{0330927C-B985-CE42-9F21-6116F20CE0EB}" type="presOf" srcId="{CED36AD2-A972-2847-AD1C-711EC23FE5F6}" destId="{E325F677-D19E-7043-981B-CF27F5616F3B}" srcOrd="1" destOrd="1" presId="urn:microsoft.com/office/officeart/2005/8/layout/hProcess4"/>
     <dgm:cxn modelId="{AC689D7C-177E-9544-B1F4-E106ACA4E995}" type="presOf" srcId="{1EAD9032-326D-754A-B211-C2EA4BB2560E}" destId="{A6260D53-AF74-3A44-B703-032707E8EE22}" srcOrd="0" destOrd="0" presId="urn:microsoft.com/office/officeart/2005/8/layout/hProcess4"/>
     <dgm:cxn modelId="{997B6B83-3050-3B4C-94D1-A19584D5706B}" srcId="{0B62EB6C-54FF-374D-AB7F-7BEB330B1BE9}" destId="{73CB681A-61F0-1C4C-9284-57E717BA40E0}" srcOrd="2" destOrd="0" parTransId="{BDE1D690-0801-EB48-94A8-7438681C2CA3}" sibTransId="{A8542BEC-974F-4643-8F24-E09AEC3844B8}"/>
-    <dgm:cxn modelId="{1600FA8A-BE84-C742-A68E-55E489712854}" type="presOf" srcId="{67376583-BBC6-894B-9D93-94AD14F2B924}" destId="{46940DAC-464E-E44F-8B91-86DEDA51697D}" srcOrd="1" destOrd="1" presId="urn:microsoft.com/office/officeart/2005/8/layout/hProcess4"/>
-    <dgm:cxn modelId="{C22D6F92-179D-574B-9E2D-383BEFD8D508}" type="presOf" srcId="{67376583-BBC6-894B-9D93-94AD14F2B924}" destId="{15516A2A-B101-2D43-9CC1-A3E92405364B}" srcOrd="0" destOrd="1" presId="urn:microsoft.com/office/officeart/2005/8/layout/hProcess4"/>
+    <dgm:cxn modelId="{C953B788-B1B6-3C4D-936E-DE25E5104997}" type="presOf" srcId="{84FF01F9-2949-F843-8C54-AC00A5244708}" destId="{15516A2A-B101-2D43-9CC1-A3E92405364B}" srcOrd="0" destOrd="1" presId="urn:microsoft.com/office/officeart/2005/8/layout/hProcess4"/>
     <dgm:cxn modelId="{96ABE695-CF1D-E04B-A6A2-0EAA3124C382}" type="presOf" srcId="{0EC0FDFF-2E8A-164A-8EE2-0B68774A8A76}" destId="{C86A7B7C-85EA-7349-A9FF-919FCE695C89}" srcOrd="0" destOrd="0" presId="urn:microsoft.com/office/officeart/2005/8/layout/hProcess4"/>
-    <dgm:cxn modelId="{B5CF009E-16E6-4B4E-A1B7-AB310749A19A}" srcId="{ADE002A1-B52E-D54C-9867-263666CD5CCE}" destId="{67376583-BBC6-894B-9D93-94AD14F2B924}" srcOrd="1" destOrd="0" parTransId="{9CC2F362-5221-9448-A2AA-4F7D2F8B3A66}" sibTransId="{708D1DBD-D48B-BB47-8CCC-005C24154BF0}"/>
     <dgm:cxn modelId="{03B95D9E-7AA8-BE4B-BBE1-03463CD401C4}" srcId="{3E6AF46F-5627-5C46-A116-A0D0C714EC0A}" destId="{621AB073-F928-0245-BA69-753CC46D416B}" srcOrd="1" destOrd="0" parTransId="{F5A42AE3-C90D-814A-A7BE-54F81B00BC52}" sibTransId="{9043EEF5-0D5C-1449-A0E3-1029D805A759}"/>
     <dgm:cxn modelId="{0B7062A0-3510-0448-8FA4-15AE66B66380}" type="presOf" srcId="{09C790D7-A826-E14F-8C65-4FB978F33989}" destId="{DE59BD45-FAE2-FA4B-AE5C-FC0EA4B29E84}" srcOrd="0" destOrd="0" presId="urn:microsoft.com/office/officeart/2005/8/layout/hProcess4"/>
     <dgm:cxn modelId="{E55C9CA9-9BAF-EC47-B1BE-22A584CF8508}" type="presOf" srcId="{FE1AB45A-3162-9447-BB07-197724914D94}" destId="{0761771F-B511-2944-9F94-5314EFACB81B}" srcOrd="0" destOrd="0" presId="urn:microsoft.com/office/officeart/2005/8/layout/hProcess4"/>
@@ -1826,6 +1816,7 @@
     <dgm:cxn modelId="{16BAAFC0-2317-A54F-95A6-E27C93B85E58}" srcId="{0B62EB6C-54FF-374D-AB7F-7BEB330B1BE9}" destId="{ADE002A1-B52E-D54C-9867-263666CD5CCE}" srcOrd="5" destOrd="0" parTransId="{5670AEDD-2433-AD4D-83C0-E383C76EB305}" sibTransId="{DB69F3AD-A019-0243-AB74-FB10F766AAA1}"/>
     <dgm:cxn modelId="{A4A836C3-6A21-F745-8992-073277A75533}" type="presOf" srcId="{45DE91CC-10F8-5845-B7D6-8BF6E8E2DF5C}" destId="{E325F677-D19E-7043-981B-CF27F5616F3B}" srcOrd="1" destOrd="0" presId="urn:microsoft.com/office/officeart/2005/8/layout/hProcess4"/>
     <dgm:cxn modelId="{E8234AC5-361F-D84D-8491-55A71F8C744C}" srcId="{FE1AB45A-3162-9447-BB07-197724914D94}" destId="{96777CE4-E116-7C45-BB26-6E1BE683C09D}" srcOrd="0" destOrd="0" parTransId="{8C8F485C-0C22-1D4B-831F-2D54E7B8E1AC}" sibTransId="{D19313BB-D8E2-0542-A131-686B78EBC114}"/>
+    <dgm:cxn modelId="{3D79B3C5-7660-264A-A766-393A07F7EED6}" type="presOf" srcId="{84FF01F9-2949-F843-8C54-AC00A5244708}" destId="{46940DAC-464E-E44F-8B91-86DEDA51697D}" srcOrd="1" destOrd="1" presId="urn:microsoft.com/office/officeart/2005/8/layout/hProcess4"/>
     <dgm:cxn modelId="{5746A6C6-F495-8E41-B985-7107E7CEC3C3}" srcId="{3E6AF46F-5627-5C46-A116-A0D0C714EC0A}" destId="{999EE839-0A79-CF48-AC03-6393BCBE7FFD}" srcOrd="0" destOrd="0" parTransId="{85E8C787-A054-1D44-8732-EDEF0649603C}" sibTransId="{8352CFD5-F2A5-DB48-82F7-2D7447ADDC1E}"/>
     <dgm:cxn modelId="{E58DBAD1-D316-2C4B-932C-73C199DB38FD}" type="presOf" srcId="{621AB073-F928-0245-BA69-753CC46D416B}" destId="{4B70CEFF-385A-2F4B-99C2-34B30B74491D}" srcOrd="0" destOrd="1" presId="urn:microsoft.com/office/officeart/2005/8/layout/hProcess4"/>
     <dgm:cxn modelId="{7E4F65D5-F994-DF4A-979D-E3BD68970C6A}" type="presOf" srcId="{A8542BEC-974F-4643-8F24-E09AEC3844B8}" destId="{E399F14F-946B-3849-88DC-A693565F6A97}" srcOrd="0" destOrd="0" presId="urn:microsoft.com/office/officeart/2005/8/layout/hProcess4"/>
@@ -3088,20 +3079,9 @@
           </a:pPr>
           <a:r>
             <a:rPr lang="en-US" sz="1600" kern="1200" dirty="0"/>
-            <a:t>Fall Prediction </a:t>
+            <a:t>Fall Prediction</a:t>
           </a:r>
-          <a:r>
-            <a:rPr lang="en-US" sz="1200" kern="1200" dirty="0"/>
-            <a:t>(60% accuracy </a:t>
-          </a:r>
-          <a:r>
-            <a:rPr lang="en-US" sz="1200" kern="1200" dirty="0" err="1"/>
-            <a:t>atm</a:t>
-          </a:r>
-          <a:r>
-            <a:rPr lang="en-US" sz="1200" kern="1200" dirty="0"/>
-            <a:t>)</a:t>
-          </a:r>
+          <a:endParaRPr lang="en-US" sz="1200" kern="1200" dirty="0"/>
         </a:p>
         <a:p>
           <a:pPr marL="171450" lvl="1" indent="-171450" algn="l" defTabSz="711200">
@@ -3120,6 +3100,7 @@
             <a:rPr lang="en-US" sz="1600" kern="1200" dirty="0"/>
             <a:t>Real time data</a:t>
           </a:r>
+          <a:endParaRPr lang="en-US" sz="1200" kern="1200" dirty="0"/>
         </a:p>
       </dsp:txBody>
       <dsp:txXfrm>
@@ -8652,15 +8633,7 @@
           <a:p>
             <a:r>
               <a:rPr lang="en-US" dirty="0"/>
-              <a:t>Almost 50% of </a:t>
-            </a:r>
-            <a:r>
-              <a:rPr lang="en-US"/>
-              <a:t>older adults who </a:t>
-            </a:r>
-            <a:r>
-              <a:rPr lang="en-US" dirty="0"/>
-              <a:t>fall experience a minor injury</a:t>
+              <a:t>Almost 50% of older adults who fall experience a minor injury</a:t>
             </a:r>
           </a:p>
           <a:p>
@@ -9980,7 +9953,7 @@
           <p:nvPr>
             <p:extLst>
               <p:ext uri="{D42A27DB-BD31-4B8C-83A1-F6EECF244321}">
-                <p14:modId xmlns:p14="http://schemas.microsoft.com/office/powerpoint/2010/main" val="3724869689"/>
+                <p14:modId xmlns:p14="http://schemas.microsoft.com/office/powerpoint/2010/main" val="3581010067"/>
               </p:ext>
             </p:extLst>
           </p:nvPr>
@@ -10009,7 +9982,7 @@
         </p:nvSpPr>
         <p:spPr>
           <a:xfrm>
-            <a:off x="10680377" y="5713435"/>
+            <a:off x="10680377" y="5747227"/>
             <a:ext cx="125506" cy="123016"/>
           </a:xfrm>
           <a:prstGeom prst="ellipse">
@@ -10123,7 +10096,7 @@
         </p:nvSpPr>
         <p:spPr>
           <a:xfrm>
-            <a:off x="10805883" y="5644138"/>
+            <a:off x="10805883" y="5677930"/>
             <a:ext cx="813043" cy="261610"/>
           </a:xfrm>
           <a:prstGeom prst="rect">
@@ -10364,7 +10337,7 @@
         </p:nvSpPr>
         <p:spPr>
           <a:xfrm>
-            <a:off x="10323532" y="3600355"/>
+            <a:off x="10323532" y="3428999"/>
             <a:ext cx="125506" cy="123016"/>
           </a:xfrm>
           <a:prstGeom prst="ellipse">
@@ -10428,14 +10401,11 @@
             <a:avLst/>
           </a:prstGeom>
           <a:solidFill>
-            <a:srgbClr val="FFFF00"/>
+            <a:schemeClr val="bg1"/>
           </a:solidFill>
           <a:ln>
             <a:solidFill>
-              <a:schemeClr val="tx1">
-                <a:lumMod val="75000"/>
-                <a:lumOff val="25000"/>
-              </a:schemeClr>
+              <a:schemeClr val="bg1"/>
             </a:solidFill>
           </a:ln>
         </p:spPr>
@@ -10749,6 +10719,155 @@
           </a:p>
         </p:txBody>
       </p:sp>
+      <p:sp>
+        <p:nvSpPr>
+          <p:cNvPr id="27" name="Oval 26">
+            <a:extLst>
+              <a:ext uri="{FF2B5EF4-FFF2-40B4-BE49-F238E27FC236}">
+                <a16:creationId xmlns:a16="http://schemas.microsoft.com/office/drawing/2014/main" id="{27BD6AC6-24BD-8842-A1C0-D1F33FDE7D7C}"/>
+              </a:ext>
+            </a:extLst>
+          </p:cNvPr>
+          <p:cNvSpPr/>
+          <p:nvPr/>
+        </p:nvSpPr>
+        <p:spPr>
+          <a:xfrm>
+            <a:off x="10680377" y="5094649"/>
+            <a:ext cx="125506" cy="123016"/>
+          </a:xfrm>
+          <a:prstGeom prst="ellipse">
+            <a:avLst/>
+          </a:prstGeom>
+          <a:solidFill>
+            <a:schemeClr val="bg1"/>
+          </a:solidFill>
+          <a:ln>
+            <a:solidFill>
+              <a:schemeClr val="tx1">
+                <a:lumMod val="75000"/>
+                <a:lumOff val="25000"/>
+              </a:schemeClr>
+            </a:solidFill>
+          </a:ln>
+        </p:spPr>
+        <p:style>
+          <a:lnRef idx="2">
+            <a:schemeClr val="accent1">
+              <a:shade val="50000"/>
+            </a:schemeClr>
+          </a:lnRef>
+          <a:fillRef idx="1">
+            <a:schemeClr val="accent1"/>
+          </a:fillRef>
+          <a:effectRef idx="0">
+            <a:schemeClr val="accent1"/>
+          </a:effectRef>
+          <a:fontRef idx="minor">
+            <a:schemeClr val="lt1"/>
+          </a:fontRef>
+        </p:style>
+        <p:txBody>
+          <a:bodyPr rtlCol="0" anchor="ctr"/>
+          <a:lstStyle/>
+          <a:p>
+            <a:pPr algn="ctr"/>
+            <a:endParaRPr lang="en-US"/>
+          </a:p>
+        </p:txBody>
+      </p:sp>
+      <p:sp>
+        <p:nvSpPr>
+          <p:cNvPr id="28" name="TextBox 27">
+            <a:extLst>
+              <a:ext uri="{FF2B5EF4-FFF2-40B4-BE49-F238E27FC236}">
+                <a16:creationId xmlns:a16="http://schemas.microsoft.com/office/drawing/2014/main" id="{EF04DCC7-D6D1-2C4C-AD7D-0C876AC89AB1}"/>
+              </a:ext>
+            </a:extLst>
+          </p:cNvPr>
+          <p:cNvSpPr txBox="1"/>
+          <p:nvPr/>
+        </p:nvSpPr>
+        <p:spPr>
+          <a:xfrm>
+            <a:off x="10796346" y="5020734"/>
+            <a:ext cx="979755" cy="261610"/>
+          </a:xfrm>
+          <a:prstGeom prst="rect">
+            <a:avLst/>
+          </a:prstGeom>
+          <a:noFill/>
+        </p:spPr>
+        <p:txBody>
+          <a:bodyPr wrap="none" rtlCol="0">
+            <a:spAutoFit/>
+          </a:bodyPr>
+          <a:lstStyle/>
+          <a:p>
+            <a:r>
+              <a:rPr lang="en-US" sz="1100" dirty="0"/>
+              <a:t>Not Initialized</a:t>
+            </a:r>
+          </a:p>
+        </p:txBody>
+      </p:sp>
+      <p:sp>
+        <p:nvSpPr>
+          <p:cNvPr id="29" name="Oval 28">
+            <a:extLst>
+              <a:ext uri="{FF2B5EF4-FFF2-40B4-BE49-F238E27FC236}">
+                <a16:creationId xmlns:a16="http://schemas.microsoft.com/office/drawing/2014/main" id="{C922C576-5749-7042-8113-6953F4128BD4}"/>
+              </a:ext>
+            </a:extLst>
+          </p:cNvPr>
+          <p:cNvSpPr/>
+          <p:nvPr/>
+        </p:nvSpPr>
+        <p:spPr>
+          <a:xfrm>
+            <a:off x="10323532" y="3166283"/>
+            <a:ext cx="125506" cy="123016"/>
+          </a:xfrm>
+          <a:prstGeom prst="ellipse">
+            <a:avLst/>
+          </a:prstGeom>
+          <a:solidFill>
+            <a:schemeClr val="bg1"/>
+          </a:solidFill>
+          <a:ln>
+            <a:solidFill>
+              <a:schemeClr val="tx1">
+                <a:lumMod val="75000"/>
+                <a:lumOff val="25000"/>
+              </a:schemeClr>
+            </a:solidFill>
+          </a:ln>
+        </p:spPr>
+        <p:style>
+          <a:lnRef idx="2">
+            <a:schemeClr val="accent1">
+              <a:shade val="50000"/>
+            </a:schemeClr>
+          </a:lnRef>
+          <a:fillRef idx="1">
+            <a:schemeClr val="accent1"/>
+          </a:fillRef>
+          <a:effectRef idx="0">
+            <a:schemeClr val="accent1"/>
+          </a:effectRef>
+          <a:fontRef idx="minor">
+            <a:schemeClr val="lt1"/>
+          </a:fontRef>
+        </p:style>
+        <p:txBody>
+          <a:bodyPr rtlCol="0" anchor="ctr"/>
+          <a:lstStyle/>
+          <a:p>
+            <a:pPr algn="ctr"/>
+            <a:endParaRPr lang="en-US"/>
+          </a:p>
+        </p:txBody>
+      </p:sp>
     </p:spTree>
     <p:extLst>
       <p:ext uri="{BB962C8B-B14F-4D97-AF65-F5344CB8AC3E}">
@@ -10763,6 +10882,265 @@
 </file>
 
 <file path=ppt/slides/slide6.xml><?xml version="1.0" encoding="utf-8"?>
+<p:sld xmlns:a="http://schemas.openxmlformats.org/drawingml/2006/main" xmlns:r="http://schemas.openxmlformats.org/officeDocument/2006/relationships" xmlns:p="http://schemas.openxmlformats.org/presentationml/2006/main">
+  <p:cSld>
+    <p:bg>
+      <p:bgPr>
+        <a:solidFill>
+          <a:srgbClr val="FDFDFD"/>
+        </a:solidFill>
+        <a:effectLst/>
+      </p:bgPr>
+    </p:bg>
+    <p:spTree>
+      <p:nvGrpSpPr>
+        <p:cNvPr id="1" name=""/>
+        <p:cNvGrpSpPr/>
+        <p:nvPr/>
+      </p:nvGrpSpPr>
+      <p:grpSpPr>
+        <a:xfrm>
+          <a:off x="0" y="0"/>
+          <a:ext cx="0" cy="0"/>
+          <a:chOff x="0" y="0"/>
+          <a:chExt cx="0" cy="0"/>
+        </a:xfrm>
+      </p:grpSpPr>
+      <p:sp>
+        <p:nvSpPr>
+          <p:cNvPr id="2" name="Title 1"/>
+          <p:cNvSpPr>
+            <a:spLocks noGrp="1"/>
+          </p:cNvSpPr>
+          <p:nvPr>
+            <p:ph type="title"/>
+          </p:nvPr>
+        </p:nvSpPr>
+        <p:spPr/>
+        <p:txBody>
+          <a:bodyPr/>
+          <a:lstStyle/>
+          <a:p>
+            <a:r>
+              <a:rPr lang="en-US" b="1" dirty="0">
+                <a:solidFill>
+                  <a:srgbClr val="004D97"/>
+                </a:solidFill>
+              </a:rPr>
+              <a:t>Exploratory Data Analysis</a:t>
+            </a:r>
+          </a:p>
+        </p:txBody>
+      </p:sp>
+      <p:pic>
+        <p:nvPicPr>
+          <p:cNvPr id="7" name="Picture 6">
+            <a:extLst>
+              <a:ext uri="{FF2B5EF4-FFF2-40B4-BE49-F238E27FC236}">
+                <a16:creationId xmlns:a16="http://schemas.microsoft.com/office/drawing/2014/main" id="{2C20F294-EAFD-6343-891B-29EE9E73069D}"/>
+              </a:ext>
+            </a:extLst>
+          </p:cNvPr>
+          <p:cNvPicPr>
+            <a:picLocks noChangeAspect="1"/>
+          </p:cNvPicPr>
+          <p:nvPr/>
+        </p:nvPicPr>
+        <p:blipFill>
+          <a:blip r:embed="rId2"/>
+          <a:stretch>
+            <a:fillRect/>
+          </a:stretch>
+        </p:blipFill>
+        <p:spPr>
+          <a:xfrm>
+            <a:off x="3246400" y="5016748"/>
+            <a:ext cx="5562600" cy="1793316"/>
+          </a:xfrm>
+          <a:prstGeom prst="rect">
+            <a:avLst/>
+          </a:prstGeom>
+        </p:spPr>
+      </p:pic>
+      <p:pic>
+        <p:nvPicPr>
+          <p:cNvPr id="9" name="Picture 8">
+            <a:extLst>
+              <a:ext uri="{FF2B5EF4-FFF2-40B4-BE49-F238E27FC236}">
+                <a16:creationId xmlns:a16="http://schemas.microsoft.com/office/drawing/2014/main" id="{01B0AD13-2D04-B343-807A-5A568988CEAC}"/>
+              </a:ext>
+            </a:extLst>
+          </p:cNvPr>
+          <p:cNvPicPr>
+            <a:picLocks noChangeAspect="1"/>
+          </p:cNvPicPr>
+          <p:nvPr/>
+        </p:nvPicPr>
+        <p:blipFill>
+          <a:blip r:embed="rId3"/>
+          <a:stretch>
+            <a:fillRect/>
+          </a:stretch>
+        </p:blipFill>
+        <p:spPr>
+          <a:xfrm>
+            <a:off x="3246400" y="3239692"/>
+            <a:ext cx="5562600" cy="1777056"/>
+          </a:xfrm>
+          <a:prstGeom prst="rect">
+            <a:avLst/>
+          </a:prstGeom>
+        </p:spPr>
+      </p:pic>
+      <p:pic>
+        <p:nvPicPr>
+          <p:cNvPr id="11" name="Picture 10">
+            <a:extLst>
+              <a:ext uri="{FF2B5EF4-FFF2-40B4-BE49-F238E27FC236}">
+                <a16:creationId xmlns:a16="http://schemas.microsoft.com/office/drawing/2014/main" id="{FA4477F1-67B7-E341-9AD1-AC174FD9482B}"/>
+              </a:ext>
+            </a:extLst>
+          </p:cNvPr>
+          <p:cNvPicPr>
+            <a:picLocks noChangeAspect="1"/>
+          </p:cNvPicPr>
+          <p:nvPr/>
+        </p:nvPicPr>
+        <p:blipFill>
+          <a:blip r:embed="rId4"/>
+          <a:stretch>
+            <a:fillRect/>
+          </a:stretch>
+        </p:blipFill>
+        <p:spPr>
+          <a:xfrm>
+            <a:off x="3246400" y="1461146"/>
+            <a:ext cx="5562600" cy="1778546"/>
+          </a:xfrm>
+          <a:prstGeom prst="rect">
+            <a:avLst/>
+          </a:prstGeom>
+        </p:spPr>
+      </p:pic>
+      <p:sp>
+        <p:nvSpPr>
+          <p:cNvPr id="12" name="TextBox 11">
+            <a:extLst>
+              <a:ext uri="{FF2B5EF4-FFF2-40B4-BE49-F238E27FC236}">
+                <a16:creationId xmlns:a16="http://schemas.microsoft.com/office/drawing/2014/main" id="{547AE4CE-95FC-024C-BC67-CBBA1BADB26B}"/>
+              </a:ext>
+            </a:extLst>
+          </p:cNvPr>
+          <p:cNvSpPr txBox="1"/>
+          <p:nvPr/>
+        </p:nvSpPr>
+        <p:spPr>
+          <a:xfrm>
+            <a:off x="9033933" y="2165753"/>
+            <a:ext cx="590418" cy="369332"/>
+          </a:xfrm>
+          <a:prstGeom prst="rect">
+            <a:avLst/>
+          </a:prstGeom>
+          <a:noFill/>
+        </p:spPr>
+        <p:txBody>
+          <a:bodyPr wrap="none" rtlCol="0">
+            <a:spAutoFit/>
+          </a:bodyPr>
+          <a:lstStyle/>
+          <a:p>
+            <a:r>
+              <a:rPr lang="en-US" dirty="0"/>
+              <a:t>Falls</a:t>
+            </a:r>
+          </a:p>
+        </p:txBody>
+      </p:sp>
+      <p:sp>
+        <p:nvSpPr>
+          <p:cNvPr id="13" name="TextBox 12">
+            <a:extLst>
+              <a:ext uri="{FF2B5EF4-FFF2-40B4-BE49-F238E27FC236}">
+                <a16:creationId xmlns:a16="http://schemas.microsoft.com/office/drawing/2014/main" id="{04ECCB06-225D-7D40-AFC1-748360DC9BA2}"/>
+              </a:ext>
+            </a:extLst>
+          </p:cNvPr>
+          <p:cNvSpPr txBox="1"/>
+          <p:nvPr/>
+        </p:nvSpPr>
+        <p:spPr>
+          <a:xfrm>
+            <a:off x="9033933" y="3943554"/>
+            <a:ext cx="1098570" cy="369332"/>
+          </a:xfrm>
+          <a:prstGeom prst="rect">
+            <a:avLst/>
+          </a:prstGeom>
+          <a:noFill/>
+        </p:spPr>
+        <p:txBody>
+          <a:bodyPr wrap="none" rtlCol="0">
+            <a:spAutoFit/>
+          </a:bodyPr>
+          <a:lstStyle/>
+          <a:p>
+            <a:r>
+              <a:rPr lang="en-US" dirty="0"/>
+              <a:t>Near Falls</a:t>
+            </a:r>
+          </a:p>
+        </p:txBody>
+      </p:sp>
+      <p:sp>
+        <p:nvSpPr>
+          <p:cNvPr id="14" name="TextBox 13">
+            <a:extLst>
+              <a:ext uri="{FF2B5EF4-FFF2-40B4-BE49-F238E27FC236}">
+                <a16:creationId xmlns:a16="http://schemas.microsoft.com/office/drawing/2014/main" id="{119B468A-C698-5B4A-8E20-6BE34F723411}"/>
+              </a:ext>
+            </a:extLst>
+          </p:cNvPr>
+          <p:cNvSpPr txBox="1"/>
+          <p:nvPr/>
+        </p:nvSpPr>
+        <p:spPr>
+          <a:xfrm>
+            <a:off x="9033933" y="5728740"/>
+            <a:ext cx="2182649" cy="369332"/>
+          </a:xfrm>
+          <a:prstGeom prst="rect">
+            <a:avLst/>
+          </a:prstGeom>
+          <a:noFill/>
+        </p:spPr>
+        <p:txBody>
+          <a:bodyPr wrap="none" rtlCol="0">
+            <a:spAutoFit/>
+          </a:bodyPr>
+          <a:lstStyle/>
+          <a:p>
+            <a:r>
+              <a:rPr lang="en-US" dirty="0"/>
+              <a:t>Activities of Daily Life</a:t>
+            </a:r>
+          </a:p>
+        </p:txBody>
+      </p:sp>
+    </p:spTree>
+    <p:extLst>
+      <p:ext uri="{BB962C8B-B14F-4D97-AF65-F5344CB8AC3E}">
+        <p14:creationId xmlns:p14="http://schemas.microsoft.com/office/powerpoint/2010/main" val="1584089805"/>
+      </p:ext>
+    </p:extLst>
+  </p:cSld>
+  <p:clrMapOvr>
+    <a:masterClrMapping/>
+  </p:clrMapOvr>
+</p:sld>
+</file>
+
+<file path=ppt/slides/slide7.xml><?xml version="1.0" encoding="utf-8"?>
 <p:sld xmlns:a="http://schemas.openxmlformats.org/drawingml/2006/main" xmlns:r="http://schemas.openxmlformats.org/officeDocument/2006/relationships" xmlns:p="http://schemas.openxmlformats.org/presentationml/2006/main">
   <p:cSld>
     <p:bg>

</xml_diff>